<commit_message>
make text bigger in workflow fig
</commit_message>
<xml_diff>
--- a/paper/figures.pptx
+++ b/paper/figures.pptx
@@ -243,7 +243,7 @@
           <a:p>
             <a:fld id="{0087396F-59F5-478F-BD4D-42B8712F80A2}" type="datetimeFigureOut">
               <a:rPr lang="en-GB" smtClean="0"/>
-              <a:t>27/03/2021</a:t>
+              <a:t>01/04/2021</a:t>
             </a:fld>
             <a:endParaRPr lang="en-GB"/>
           </a:p>
@@ -413,7 +413,7 @@
           <a:p>
             <a:fld id="{0087396F-59F5-478F-BD4D-42B8712F80A2}" type="datetimeFigureOut">
               <a:rPr lang="en-GB" smtClean="0"/>
-              <a:t>27/03/2021</a:t>
+              <a:t>01/04/2021</a:t>
             </a:fld>
             <a:endParaRPr lang="en-GB"/>
           </a:p>
@@ -593,7 +593,7 @@
           <a:p>
             <a:fld id="{0087396F-59F5-478F-BD4D-42B8712F80A2}" type="datetimeFigureOut">
               <a:rPr lang="en-GB" smtClean="0"/>
-              <a:t>27/03/2021</a:t>
+              <a:t>01/04/2021</a:t>
             </a:fld>
             <a:endParaRPr lang="en-GB"/>
           </a:p>
@@ -763,7 +763,7 @@
           <a:p>
             <a:fld id="{0087396F-59F5-478F-BD4D-42B8712F80A2}" type="datetimeFigureOut">
               <a:rPr lang="en-GB" smtClean="0"/>
-              <a:t>27/03/2021</a:t>
+              <a:t>01/04/2021</a:t>
             </a:fld>
             <a:endParaRPr lang="en-GB"/>
           </a:p>
@@ -1007,7 +1007,7 @@
           <a:p>
             <a:fld id="{0087396F-59F5-478F-BD4D-42B8712F80A2}" type="datetimeFigureOut">
               <a:rPr lang="en-GB" smtClean="0"/>
-              <a:t>27/03/2021</a:t>
+              <a:t>01/04/2021</a:t>
             </a:fld>
             <a:endParaRPr lang="en-GB"/>
           </a:p>
@@ -1239,7 +1239,7 @@
           <a:p>
             <a:fld id="{0087396F-59F5-478F-BD4D-42B8712F80A2}" type="datetimeFigureOut">
               <a:rPr lang="en-GB" smtClean="0"/>
-              <a:t>27/03/2021</a:t>
+              <a:t>01/04/2021</a:t>
             </a:fld>
             <a:endParaRPr lang="en-GB"/>
           </a:p>
@@ -1606,7 +1606,7 @@
           <a:p>
             <a:fld id="{0087396F-59F5-478F-BD4D-42B8712F80A2}" type="datetimeFigureOut">
               <a:rPr lang="en-GB" smtClean="0"/>
-              <a:t>27/03/2021</a:t>
+              <a:t>01/04/2021</a:t>
             </a:fld>
             <a:endParaRPr lang="en-GB"/>
           </a:p>
@@ -1724,7 +1724,7 @@
           <a:p>
             <a:fld id="{0087396F-59F5-478F-BD4D-42B8712F80A2}" type="datetimeFigureOut">
               <a:rPr lang="en-GB" smtClean="0"/>
-              <a:t>27/03/2021</a:t>
+              <a:t>01/04/2021</a:t>
             </a:fld>
             <a:endParaRPr lang="en-GB"/>
           </a:p>
@@ -1819,7 +1819,7 @@
           <a:p>
             <a:fld id="{0087396F-59F5-478F-BD4D-42B8712F80A2}" type="datetimeFigureOut">
               <a:rPr lang="en-GB" smtClean="0"/>
-              <a:t>27/03/2021</a:t>
+              <a:t>01/04/2021</a:t>
             </a:fld>
             <a:endParaRPr lang="en-GB"/>
           </a:p>
@@ -2096,7 +2096,7 @@
           <a:p>
             <a:fld id="{0087396F-59F5-478F-BD4D-42B8712F80A2}" type="datetimeFigureOut">
               <a:rPr lang="en-GB" smtClean="0"/>
-              <a:t>27/03/2021</a:t>
+              <a:t>01/04/2021</a:t>
             </a:fld>
             <a:endParaRPr lang="en-GB"/>
           </a:p>
@@ -2353,7 +2353,7 @@
           <a:p>
             <a:fld id="{0087396F-59F5-478F-BD4D-42B8712F80A2}" type="datetimeFigureOut">
               <a:rPr lang="en-GB" smtClean="0"/>
-              <a:t>27/03/2021</a:t>
+              <a:t>01/04/2021</a:t>
             </a:fld>
             <a:endParaRPr lang="en-GB"/>
           </a:p>
@@ -2566,7 +2566,7 @@
           <a:p>
             <a:fld id="{0087396F-59F5-478F-BD4D-42B8712F80A2}" type="datetimeFigureOut">
               <a:rPr lang="en-GB" smtClean="0"/>
-              <a:t>27/03/2021</a:t>
+              <a:t>01/04/2021</a:t>
             </a:fld>
             <a:endParaRPr lang="en-GB"/>
           </a:p>
@@ -2985,8 +2985,8 @@
         </p:nvSpPr>
         <p:spPr>
           <a:xfrm>
-            <a:off x="110598" y="6224787"/>
-            <a:ext cx="3534302" cy="1794164"/>
+            <a:off x="71883" y="6495055"/>
+            <a:ext cx="4035840" cy="1794164"/>
           </a:xfrm>
           <a:prstGeom prst="rect">
             <a:avLst/>
@@ -3016,7 +3016,7 @@
           <a:p>
             <a:pPr algn="ctr"/>
             <a:r>
-              <a:rPr lang="fr-FR" sz="2400" b="1" dirty="0" err="1">
+              <a:rPr lang="fr-FR" sz="2800" b="1" dirty="0" err="1">
                 <a:solidFill>
                   <a:srgbClr val="CD00B4"/>
                 </a:solidFill>
@@ -3025,7 +3025,7 @@
               <a:t>model_performance</a:t>
             </a:r>
             <a:r>
-              <a:rPr lang="fr-FR" sz="2400" b="1" dirty="0">
+              <a:rPr lang="fr-FR" sz="2800" b="1" dirty="0">
                 <a:solidFill>
                   <a:srgbClr val="CD00B4"/>
                 </a:solidFill>
@@ -3040,7 +3040,7 @@
               <a:buChar char="ü"/>
             </a:pPr>
             <a:r>
-              <a:rPr lang="fr-FR" sz="1400" i="1" dirty="0">
+              <a:rPr lang="fr-FR" i="1" dirty="0">
                 <a:latin typeface="Century Gothic" panose="020B0502020202020204" pitchFamily="34" charset="0"/>
               </a:rPr>
               <a:t>AIC</a:t>
@@ -3052,7 +3052,7 @@
               <a:buChar char="ü"/>
             </a:pPr>
             <a:r>
-              <a:rPr lang="fr-FR" sz="1400" i="1" dirty="0">
+              <a:rPr lang="fr-FR" i="1" dirty="0">
                 <a:latin typeface="Century Gothic" panose="020B0502020202020204" pitchFamily="34" charset="0"/>
               </a:rPr>
               <a:t>BIC</a:t>
@@ -3064,7 +3064,7 @@
               <a:buChar char="ü"/>
             </a:pPr>
             <a:r>
-              <a:rPr lang="fr-FR" sz="1400" i="1" dirty="0">
+              <a:rPr lang="fr-FR" i="1" dirty="0">
                 <a:latin typeface="Century Gothic" panose="020B0502020202020204" pitchFamily="34" charset="0"/>
               </a:rPr>
               <a:t>ICC</a:t>
@@ -3076,7 +3076,7 @@
               <a:buChar char="ü"/>
             </a:pPr>
             <a:r>
-              <a:rPr lang="fr-FR" sz="1400" i="1" dirty="0">
+              <a:rPr lang="fr-FR" i="1" dirty="0">
                 <a:latin typeface="Century Gothic" panose="020B0502020202020204" pitchFamily="34" charset="0"/>
               </a:rPr>
               <a:t>R2</a:t>
@@ -3088,7 +3088,7 @@
               <a:buChar char="ü"/>
             </a:pPr>
             <a:r>
-              <a:rPr lang="fr-FR" sz="1400" i="1" dirty="0">
+              <a:rPr lang="fr-FR" i="1" dirty="0">
                 <a:latin typeface="Century Gothic" panose="020B0502020202020204" pitchFamily="34" charset="0"/>
               </a:rPr>
               <a:t>RMSE</a:t>
@@ -3100,12 +3100,12 @@
               <a:buChar char="ü"/>
             </a:pPr>
             <a:r>
-              <a:rPr lang="fr-FR" sz="1400" i="1" dirty="0">
+              <a:rPr lang="fr-FR" i="1" dirty="0">
                 <a:latin typeface="Century Gothic" panose="020B0502020202020204" pitchFamily="34" charset="0"/>
               </a:rPr>
               <a:t>…</a:t>
             </a:r>
-            <a:endParaRPr lang="fr-FR" sz="1200" i="1" dirty="0">
+            <a:endParaRPr lang="fr-FR" sz="1600" i="1" dirty="0">
               <a:latin typeface="Century Gothic" panose="020B0502020202020204" pitchFamily="34" charset="0"/>
             </a:endParaRPr>
           </a:p>
@@ -3223,8 +3223,8 @@
         </p:nvSpPr>
         <p:spPr>
           <a:xfrm>
-            <a:off x="531549" y="3452013"/>
-            <a:ext cx="2692400" cy="2071989"/>
+            <a:off x="334818" y="3452013"/>
+            <a:ext cx="3074467" cy="2071989"/>
           </a:xfrm>
           <a:prstGeom prst="rect">
             <a:avLst/>
@@ -3254,7 +3254,7 @@
           <a:p>
             <a:pPr algn="ctr"/>
             <a:r>
-              <a:rPr lang="fr-FR" sz="2400" b="1" dirty="0" err="1">
+              <a:rPr lang="fr-FR" sz="2800" b="1" dirty="0" err="1">
                 <a:solidFill>
                   <a:srgbClr val="CD00B4"/>
                 </a:solidFill>
@@ -3263,7 +3263,7 @@
               <a:t>check_model</a:t>
             </a:r>
             <a:r>
-              <a:rPr lang="fr-FR" sz="2400" b="1" dirty="0">
+              <a:rPr lang="fr-FR" sz="2800" b="1" dirty="0">
                 <a:solidFill>
                   <a:srgbClr val="CD00B4"/>
                 </a:solidFill>
@@ -3278,12 +3278,12 @@
               <a:buChar char="ü"/>
             </a:pPr>
             <a:r>
-              <a:rPr lang="fr-FR" sz="1400" i="1" dirty="0" err="1">
+              <a:rPr lang="fr-FR" i="1" dirty="0" err="1">
                 <a:latin typeface="Century Gothic" panose="020B0502020202020204" pitchFamily="34" charset="0"/>
               </a:rPr>
               <a:t>Linearity</a:t>
             </a:r>
-            <a:endParaRPr lang="fr-FR" sz="1400" i="1" dirty="0">
+            <a:endParaRPr lang="fr-FR" i="1" dirty="0">
               <a:latin typeface="Century Gothic" panose="020B0502020202020204" pitchFamily="34" charset="0"/>
             </a:endParaRPr>
           </a:p>
@@ -3293,12 +3293,12 @@
               <a:buChar char="ü"/>
             </a:pPr>
             <a:r>
-              <a:rPr lang="fr-FR" sz="1400" i="1" dirty="0" err="1">
+              <a:rPr lang="fr-FR" i="1" dirty="0" err="1">
                 <a:latin typeface="Century Gothic" panose="020B0502020202020204" pitchFamily="34" charset="0"/>
               </a:rPr>
               <a:t>Homogenity</a:t>
             </a:r>
-            <a:endParaRPr lang="fr-FR" sz="1400" i="1" dirty="0">
+            <a:endParaRPr lang="fr-FR" i="1" dirty="0">
               <a:latin typeface="Century Gothic" panose="020B0502020202020204" pitchFamily="34" charset="0"/>
             </a:endParaRPr>
           </a:p>
@@ -3308,12 +3308,12 @@
               <a:buChar char="ü"/>
             </a:pPr>
             <a:r>
-              <a:rPr lang="fr-FR" sz="1400" i="1" dirty="0" err="1">
+              <a:rPr lang="fr-FR" i="1" dirty="0" err="1">
                 <a:latin typeface="Century Gothic" panose="020B0502020202020204" pitchFamily="34" charset="0"/>
               </a:rPr>
               <a:t>Heteroscedasticity</a:t>
             </a:r>
-            <a:endParaRPr lang="fr-FR" sz="1400" i="1" dirty="0">
+            <a:endParaRPr lang="fr-FR" i="1" dirty="0">
               <a:latin typeface="Century Gothic" panose="020B0502020202020204" pitchFamily="34" charset="0"/>
             </a:endParaRPr>
           </a:p>
@@ -3323,12 +3323,12 @@
               <a:buChar char="ü"/>
             </a:pPr>
             <a:r>
-              <a:rPr lang="fr-FR" sz="1400" i="1" dirty="0" err="1">
+              <a:rPr lang="fr-FR" i="1" dirty="0" err="1">
                 <a:latin typeface="Century Gothic" panose="020B0502020202020204" pitchFamily="34" charset="0"/>
               </a:rPr>
               <a:t>Collinearity</a:t>
             </a:r>
-            <a:endParaRPr lang="fr-FR" sz="1400" i="1" dirty="0">
+            <a:endParaRPr lang="fr-FR" i="1" dirty="0">
               <a:latin typeface="Century Gothic" panose="020B0502020202020204" pitchFamily="34" charset="0"/>
             </a:endParaRPr>
           </a:p>
@@ -3338,12 +3338,12 @@
               <a:buChar char="ü"/>
             </a:pPr>
             <a:r>
-              <a:rPr lang="fr-FR" sz="1400" i="1" dirty="0" err="1">
+              <a:rPr lang="fr-FR" i="1" dirty="0" err="1">
                 <a:latin typeface="Century Gothic" panose="020B0502020202020204" pitchFamily="34" charset="0"/>
               </a:rPr>
               <a:t>Outliers</a:t>
             </a:r>
-            <a:endParaRPr lang="fr-FR" sz="1400" i="1" dirty="0">
+            <a:endParaRPr lang="fr-FR" i="1" dirty="0">
               <a:latin typeface="Century Gothic" panose="020B0502020202020204" pitchFamily="34" charset="0"/>
             </a:endParaRPr>
           </a:p>
@@ -3353,12 +3353,12 @@
               <a:buChar char="ü"/>
             </a:pPr>
             <a:r>
-              <a:rPr lang="fr-FR" sz="1400" i="1" dirty="0">
+              <a:rPr lang="fr-FR" i="1" dirty="0">
                 <a:latin typeface="Century Gothic" panose="020B0502020202020204" pitchFamily="34" charset="0"/>
               </a:rPr>
               <a:t>…</a:t>
             </a:r>
-            <a:endParaRPr lang="en-GB" sz="1400" i="1" dirty="0">
+            <a:endParaRPr lang="en-GB" i="1" dirty="0">
               <a:latin typeface="Century Gothic" panose="020B0502020202020204" pitchFamily="34" charset="0"/>
             </a:endParaRPr>
           </a:p>
@@ -3409,7 +3409,7 @@
           <a:p>
             <a:pPr algn="ctr"/>
             <a:r>
-              <a:rPr lang="fr-FR" sz="2000" b="1" dirty="0" err="1">
+              <a:rPr lang="fr-FR" sz="2400" b="1" dirty="0" err="1">
                 <a:solidFill>
                   <a:srgbClr val="CD00B4"/>
                 </a:solidFill>
@@ -3418,7 +3418,7 @@
               <a:t>compare_performance</a:t>
             </a:r>
             <a:r>
-              <a:rPr lang="fr-FR" sz="2000" b="1" dirty="0">
+              <a:rPr lang="fr-FR" sz="2400" b="1" dirty="0">
                 <a:solidFill>
                   <a:srgbClr val="CD00B4"/>
                 </a:solidFill>
@@ -3426,7 +3426,7 @@
               </a:rPr>
               <a:t>()</a:t>
             </a:r>
-            <a:endParaRPr lang="en-GB" sz="2000" b="1" dirty="0">
+            <a:endParaRPr lang="en-GB" sz="2400" b="1" dirty="0">
               <a:solidFill>
                 <a:srgbClr val="CD00B4"/>
               </a:solidFill>
@@ -3480,7 +3480,7 @@
           <a:p>
             <a:pPr algn="ctr"/>
             <a:r>
-              <a:rPr lang="fr-FR" sz="2000" b="1" dirty="0" err="1">
+              <a:rPr lang="fr-FR" sz="2400" b="1" dirty="0" err="1">
                 <a:solidFill>
                   <a:srgbClr val="CD00B4"/>
                 </a:solidFill>
@@ -3489,7 +3489,7 @@
               <a:t>test_performance</a:t>
             </a:r>
             <a:r>
-              <a:rPr lang="fr-FR" sz="2000" b="1" dirty="0">
+              <a:rPr lang="fr-FR" sz="2400" b="1" dirty="0">
                 <a:solidFill>
                   <a:srgbClr val="CD00B4"/>
                 </a:solidFill>
@@ -3499,12 +3499,9 @@
             </a:r>
           </a:p>
           <a:p>
-            <a:pPr marL="342900" indent="-342900" algn="ctr">
-              <a:buFont typeface="Wingdings" panose="05000000000000000000" pitchFamily="2" charset="2"/>
-              <a:buChar char="ü"/>
-            </a:pPr>
-            <a:r>
-              <a:rPr lang="fr-FR" sz="1400" i="1" dirty="0">
+            <a:pPr algn="ctr"/>
+            <a:r>
+              <a:rPr lang="fr-FR" i="1" dirty="0">
                 <a:latin typeface="Century Gothic" panose="020B0502020202020204" pitchFamily="34" charset="0"/>
               </a:rPr>
               <a:t>Model 1 &gt; Model 2 (p &lt; .042)</a:t>
@@ -3998,8 +3995,8 @@
         </p:nvSpPr>
         <p:spPr>
           <a:xfrm>
-            <a:off x="7045624" y="6224787"/>
-            <a:ext cx="3534302" cy="1794164"/>
+            <a:off x="6947003" y="6495055"/>
+            <a:ext cx="4035840" cy="1794164"/>
           </a:xfrm>
           <a:prstGeom prst="rect">
             <a:avLst/>
@@ -4029,7 +4026,7 @@
           <a:p>
             <a:pPr algn="ctr"/>
             <a:r>
-              <a:rPr lang="fr-FR" sz="2400" b="1" dirty="0" err="1">
+              <a:rPr lang="fr-FR" sz="2800" b="1" dirty="0" err="1">
                 <a:solidFill>
                   <a:srgbClr val="CD00B4"/>
                 </a:solidFill>
@@ -4038,7 +4035,7 @@
               <a:t>model_performance</a:t>
             </a:r>
             <a:r>
-              <a:rPr lang="fr-FR" sz="2400" b="1" dirty="0">
+              <a:rPr lang="fr-FR" sz="2800" b="1" dirty="0">
                 <a:solidFill>
                   <a:srgbClr val="CD00B4"/>
                 </a:solidFill>
@@ -4053,7 +4050,7 @@
               <a:buChar char="ü"/>
             </a:pPr>
             <a:r>
-              <a:rPr lang="fr-FR" sz="1400" i="1" dirty="0">
+              <a:rPr lang="fr-FR" i="1" dirty="0">
                 <a:latin typeface="Century Gothic" panose="020B0502020202020204" pitchFamily="34" charset="0"/>
               </a:rPr>
               <a:t>AIC</a:t>
@@ -4065,7 +4062,7 @@
               <a:buChar char="ü"/>
             </a:pPr>
             <a:r>
-              <a:rPr lang="fr-FR" sz="1400" i="1" dirty="0">
+              <a:rPr lang="fr-FR" i="1" dirty="0">
                 <a:latin typeface="Century Gothic" panose="020B0502020202020204" pitchFamily="34" charset="0"/>
               </a:rPr>
               <a:t>BIC</a:t>
@@ -4077,7 +4074,7 @@
               <a:buChar char="ü"/>
             </a:pPr>
             <a:r>
-              <a:rPr lang="fr-FR" sz="1400" i="1" dirty="0">
+              <a:rPr lang="fr-FR" i="1" dirty="0">
                 <a:latin typeface="Century Gothic" panose="020B0502020202020204" pitchFamily="34" charset="0"/>
               </a:rPr>
               <a:t>ICC</a:t>
@@ -4089,7 +4086,7 @@
               <a:buChar char="ü"/>
             </a:pPr>
             <a:r>
-              <a:rPr lang="fr-FR" sz="1400" i="1" dirty="0">
+              <a:rPr lang="fr-FR" i="1" dirty="0">
                 <a:latin typeface="Century Gothic" panose="020B0502020202020204" pitchFamily="34" charset="0"/>
               </a:rPr>
               <a:t>R2</a:t>
@@ -4101,7 +4098,7 @@
               <a:buChar char="ü"/>
             </a:pPr>
             <a:r>
-              <a:rPr lang="fr-FR" sz="1400" i="1" dirty="0">
+              <a:rPr lang="fr-FR" i="1" dirty="0">
                 <a:latin typeface="Century Gothic" panose="020B0502020202020204" pitchFamily="34" charset="0"/>
               </a:rPr>
               <a:t>RMSE</a:t>
@@ -4113,12 +4110,12 @@
               <a:buChar char="ü"/>
             </a:pPr>
             <a:r>
-              <a:rPr lang="fr-FR" sz="1400" i="1" dirty="0">
+              <a:rPr lang="fr-FR" i="1" dirty="0">
                 <a:latin typeface="Century Gothic" panose="020B0502020202020204" pitchFamily="34" charset="0"/>
               </a:rPr>
               <a:t>…</a:t>
             </a:r>
-            <a:endParaRPr lang="fr-FR" sz="1200" i="1" dirty="0">
+            <a:endParaRPr lang="fr-FR" sz="1600" i="1" dirty="0">
               <a:latin typeface="Century Gothic" panose="020B0502020202020204" pitchFamily="34" charset="0"/>
             </a:endParaRPr>
           </a:p>
@@ -4236,8 +4233,8 @@
         </p:nvSpPr>
         <p:spPr>
           <a:xfrm>
-            <a:off x="7466575" y="3452013"/>
-            <a:ext cx="2692400" cy="2071989"/>
+            <a:off x="7275541" y="3459181"/>
+            <a:ext cx="3074467" cy="2071989"/>
           </a:xfrm>
           <a:prstGeom prst="rect">
             <a:avLst/>
@@ -4267,7 +4264,7 @@
           <a:p>
             <a:pPr algn="ctr"/>
             <a:r>
-              <a:rPr lang="fr-FR" sz="2400" b="1" dirty="0" err="1">
+              <a:rPr lang="fr-FR" sz="2800" b="1" dirty="0" err="1">
                 <a:solidFill>
                   <a:srgbClr val="CD00B4"/>
                 </a:solidFill>
@@ -4276,7 +4273,7 @@
               <a:t>check_model</a:t>
             </a:r>
             <a:r>
-              <a:rPr lang="fr-FR" sz="2400" b="1" dirty="0">
+              <a:rPr lang="fr-FR" sz="2800" b="1" dirty="0">
                 <a:solidFill>
                   <a:srgbClr val="CD00B4"/>
                 </a:solidFill>
@@ -4291,12 +4288,12 @@
               <a:buChar char="ü"/>
             </a:pPr>
             <a:r>
-              <a:rPr lang="fr-FR" sz="1400" i="1" dirty="0" err="1">
+              <a:rPr lang="fr-FR" i="1" dirty="0" err="1">
                 <a:latin typeface="Century Gothic" panose="020B0502020202020204" pitchFamily="34" charset="0"/>
               </a:rPr>
               <a:t>Linearity</a:t>
             </a:r>
-            <a:endParaRPr lang="fr-FR" sz="1400" i="1" dirty="0">
+            <a:endParaRPr lang="fr-FR" i="1" dirty="0">
               <a:latin typeface="Century Gothic" panose="020B0502020202020204" pitchFamily="34" charset="0"/>
             </a:endParaRPr>
           </a:p>
@@ -4306,12 +4303,12 @@
               <a:buChar char="ü"/>
             </a:pPr>
             <a:r>
-              <a:rPr lang="fr-FR" sz="1400" i="1" dirty="0" err="1">
+              <a:rPr lang="fr-FR" i="1" dirty="0" err="1">
                 <a:latin typeface="Century Gothic" panose="020B0502020202020204" pitchFamily="34" charset="0"/>
               </a:rPr>
               <a:t>Homogenity</a:t>
             </a:r>
-            <a:endParaRPr lang="fr-FR" sz="1400" i="1" dirty="0">
+            <a:endParaRPr lang="fr-FR" i="1" dirty="0">
               <a:latin typeface="Century Gothic" panose="020B0502020202020204" pitchFamily="34" charset="0"/>
             </a:endParaRPr>
           </a:p>
@@ -4321,12 +4318,12 @@
               <a:buChar char="ü"/>
             </a:pPr>
             <a:r>
-              <a:rPr lang="fr-FR" sz="1400" i="1" dirty="0" err="1">
+              <a:rPr lang="fr-FR" i="1" dirty="0" err="1">
                 <a:latin typeface="Century Gothic" panose="020B0502020202020204" pitchFamily="34" charset="0"/>
               </a:rPr>
               <a:t>Heteroscedasticity</a:t>
             </a:r>
-            <a:endParaRPr lang="fr-FR" sz="1400" i="1" dirty="0">
+            <a:endParaRPr lang="fr-FR" i="1" dirty="0">
               <a:latin typeface="Century Gothic" panose="020B0502020202020204" pitchFamily="34" charset="0"/>
             </a:endParaRPr>
           </a:p>
@@ -4336,12 +4333,12 @@
               <a:buChar char="ü"/>
             </a:pPr>
             <a:r>
-              <a:rPr lang="fr-FR" sz="1400" i="1" dirty="0" err="1">
+              <a:rPr lang="fr-FR" i="1" dirty="0" err="1">
                 <a:latin typeface="Century Gothic" panose="020B0502020202020204" pitchFamily="34" charset="0"/>
               </a:rPr>
               <a:t>Collinearity</a:t>
             </a:r>
-            <a:endParaRPr lang="fr-FR" sz="1400" i="1" dirty="0">
+            <a:endParaRPr lang="fr-FR" i="1" dirty="0">
               <a:latin typeface="Century Gothic" panose="020B0502020202020204" pitchFamily="34" charset="0"/>
             </a:endParaRPr>
           </a:p>
@@ -4351,12 +4348,12 @@
               <a:buChar char="ü"/>
             </a:pPr>
             <a:r>
-              <a:rPr lang="fr-FR" sz="1400" i="1" dirty="0" err="1">
+              <a:rPr lang="fr-FR" i="1" dirty="0" err="1">
                 <a:latin typeface="Century Gothic" panose="020B0502020202020204" pitchFamily="34" charset="0"/>
               </a:rPr>
               <a:t>Outliers</a:t>
             </a:r>
-            <a:endParaRPr lang="fr-FR" sz="1400" i="1" dirty="0">
+            <a:endParaRPr lang="fr-FR" i="1" dirty="0">
               <a:latin typeface="Century Gothic" panose="020B0502020202020204" pitchFamily="34" charset="0"/>
             </a:endParaRPr>
           </a:p>
@@ -4366,12 +4363,12 @@
               <a:buChar char="ü"/>
             </a:pPr>
             <a:r>
-              <a:rPr lang="fr-FR" sz="1400" i="1" dirty="0">
+              <a:rPr lang="fr-FR" i="1" dirty="0">
                 <a:latin typeface="Century Gothic" panose="020B0502020202020204" pitchFamily="34" charset="0"/>
               </a:rPr>
               <a:t>…</a:t>
             </a:r>
-            <a:endParaRPr lang="en-GB" sz="1400" i="1" dirty="0">
+            <a:endParaRPr lang="en-GB" i="1" dirty="0">
               <a:latin typeface="Century Gothic" panose="020B0502020202020204" pitchFamily="34" charset="0"/>
             </a:endParaRPr>
           </a:p>
@@ -4395,8 +4392,8 @@
         </p:nvCxnSpPr>
         <p:spPr>
           <a:xfrm flipH="1">
-            <a:off x="1877749" y="2378597"/>
-            <a:ext cx="1" cy="1073416"/>
+            <a:off x="1872052" y="2378597"/>
+            <a:ext cx="0" cy="1073416"/>
           </a:xfrm>
           <a:prstGeom prst="straightConnector1">
             <a:avLst/>
@@ -4523,11 +4520,14 @@
         </p:nvSpPr>
         <p:spPr>
           <a:xfrm>
-            <a:off x="2089803" y="6495336"/>
-            <a:ext cx="3240000" cy="1794164"/>
+            <a:off x="2089803" y="6597418"/>
+            <a:ext cx="3240000" cy="1692082"/>
           </a:xfrm>
           <a:prstGeom prst="arc">
-            <a:avLst/>
+            <a:avLst>
+              <a:gd name="adj1" fmla="val 17318132"/>
+              <a:gd name="adj2" fmla="val 0"/>
+            </a:avLst>
           </a:prstGeom>
           <a:ln w="28575">
             <a:headEnd type="triangle" w="med" len="med"/>
@@ -4576,7 +4576,7 @@
         <p:spPr>
           <a:xfrm flipH="1">
             <a:off x="8812775" y="2375951"/>
-            <a:ext cx="1" cy="1076062"/>
+            <a:ext cx="1" cy="1083230"/>
           </a:xfrm>
           <a:prstGeom prst="straightConnector1">
             <a:avLst/>
@@ -4703,11 +4703,14 @@
         </p:nvSpPr>
         <p:spPr>
           <a:xfrm flipH="1">
-            <a:off x="5329803" y="6495336"/>
-            <a:ext cx="3240000" cy="1794164"/>
+            <a:off x="5329803" y="6597418"/>
+            <a:ext cx="3240000" cy="1692082"/>
           </a:xfrm>
           <a:prstGeom prst="arc">
-            <a:avLst/>
+            <a:avLst>
+              <a:gd name="adj1" fmla="val 16678524"/>
+              <a:gd name="adj2" fmla="val 0"/>
+            </a:avLst>
           </a:prstGeom>
           <a:ln w="28575">
             <a:headEnd type="triangle" w="med" len="med"/>

</xml_diff>